<commit_message>
changed the slide a bit
experimental setup and provisionl conslusion
</commit_message>
<xml_diff>
--- a/Presentation/Presentation1.pptx
+++ b/Presentation/Presentation1.pptx
@@ -14246,16 +14246,25 @@
           <a:p>
             <a:r>
               <a:rPr lang="nl-NL" dirty="0" smtClean="0"/>
+              <a:t>Java</a:t>
+            </a:r>
+          </a:p>
+          <a:p>
+            <a:pPr lvl="1"/>
+            <a:r>
+              <a:rPr lang="nl-NL" dirty="0" smtClean="0"/>
               <a:t>Table generator</a:t>
             </a:r>
           </a:p>
           <a:p>
+            <a:pPr lvl="1"/>
             <a:r>
               <a:rPr lang="nl-NL" dirty="0" smtClean="0"/>
               <a:t>Graph generator</a:t>
             </a:r>
           </a:p>
           <a:p>
+            <a:pPr lvl="1"/>
             <a:r>
               <a:rPr lang="nl-NL" dirty="0" smtClean="0"/>
               <a:t>Graph translator / Query generator</a:t>
@@ -14263,8 +14272,12 @@
           </a:p>
           <a:p>
             <a:r>
+              <a:rPr lang="nl-NL" dirty="0"/>
+              <a:t>P</a:t>
+            </a:r>
+            <a:r>
               <a:rPr lang="nl-NL" dirty="0" smtClean="0"/>
-              <a:t>SQL engine</a:t>
+              <a:t>ostgreSQL engine</a:t>
             </a:r>
           </a:p>
         </p:txBody>
@@ -14292,7 +14305,7 @@
         </p:blipFill>
         <p:spPr bwMode="auto">
           <a:xfrm>
-            <a:off x="566529" y="3958027"/>
+            <a:off x="566529" y="4437112"/>
             <a:ext cx="8100391" cy="1559205"/>
           </a:xfrm>
           <a:prstGeom prst="rect">
@@ -15603,13 +15616,19 @@
         <p:spPr/>
         <p:txBody>
           <a:bodyPr>
-            <a:normAutofit/>
+            <a:normAutofit lnSpcReduction="10000"/>
           </a:bodyPr>
           <a:lstStyle/>
           <a:p>
             <a:r>
               <a:rPr lang="nl-NL" dirty="0" smtClean="0"/>
               <a:t>Almost no difference between approaches</a:t>
+            </a:r>
+          </a:p>
+          <a:p>
+            <a:r>
+              <a:rPr lang="nl-NL" dirty="0" smtClean="0"/>
+              <a:t>Almost no difference with the paper</a:t>
             </a:r>
           </a:p>
           <a:p>

</xml_diff>

<commit_message>
changed the slies a bit
small typos
</commit_message>
<xml_diff>
--- a/Presentation/Presentation1.pptx
+++ b/Presentation/Presentation1.pptx
@@ -12721,7 +12721,23 @@
                   <a:schemeClr val="tx1"/>
                 </a:solidFill>
               </a:rPr>
-              <a:t>J.J.H.M Wulms </a:t>
+              <a:t>J. </a:t>
+            </a:r>
+            <a:r>
+              <a:rPr lang="en-US" sz="2800" dirty="0" err="1" smtClean="0">
+                <a:solidFill>
+                  <a:schemeClr val="tx1"/>
+                </a:solidFill>
+              </a:rPr>
+              <a:t>Wulms</a:t>
+            </a:r>
+            <a:r>
+              <a:rPr lang="en-US" sz="2800" smtClean="0">
+                <a:solidFill>
+                  <a:schemeClr val="tx1"/>
+                </a:solidFill>
+              </a:rPr>
+              <a:t>	 </a:t>
             </a:r>
             <a:r>
               <a:rPr lang="en-US" sz="2800" dirty="0">
@@ -13748,7 +13764,7 @@
         <p:spPr/>
         <p:txBody>
           <a:bodyPr>
-            <a:normAutofit lnSpcReduction="10000"/>
+            <a:normAutofit fontScale="92500"/>
           </a:bodyPr>
           <a:lstStyle/>
           <a:p>
@@ -13757,15 +13773,7 @@
             </a:pPr>
             <a:r>
               <a:rPr lang="en-US" dirty="0" smtClean="0"/>
-              <a:t>Step 3 </a:t>
-            </a:r>
-            <a:r>
-              <a:rPr lang="en-US" smtClean="0"/>
-              <a:t>: Build </a:t>
-            </a:r>
-            <a:r>
-              <a:rPr lang="en-US" dirty="0" smtClean="0"/>
-              <a:t>the SQL query</a:t>
+              <a:t>Step 3 : Build the SQL query</a:t>
             </a:r>
           </a:p>
           <a:p>
@@ -13818,12 +13826,12 @@
               <a:t>	all </a:t>
             </a:r>
             <a:r>
-              <a:rPr lang="en-US" dirty="0" err="1" smtClean="0"/>
-              <a:t>edjes</a:t>
-            </a:r>
-            <a:r>
               <a:rPr lang="en-US" dirty="0" smtClean="0"/>
-              <a:t> and </a:t>
+              <a:t>edges </a:t>
+            </a:r>
+            <a:r>
+              <a:rPr lang="en-US" dirty="0" smtClean="0"/>
+              <a:t>and </a:t>
             </a:r>
             <a:r>
               <a:rPr lang="en-US" dirty="0" err="1" smtClean="0"/>
@@ -13849,7 +13857,15 @@
             </a:r>
             <a:r>
               <a:rPr lang="en-US" dirty="0" smtClean="0"/>
-              <a:t>	them		</a:t>
+              <a:t>	them	</a:t>
+            </a:r>
+            <a:r>
+              <a:rPr lang="en-US" dirty="0"/>
+              <a:t> </a:t>
+            </a:r>
+            <a:r>
+              <a:rPr lang="en-US" dirty="0" smtClean="0"/>
+              <a:t>     </a:t>
             </a:r>
             <a:r>
               <a:rPr lang="en-US" u="sng" dirty="0" smtClean="0"/>
@@ -13857,8 +13873,13 @@
             </a:r>
             <a:r>
               <a:rPr lang="en-US" dirty="0" smtClean="0"/>
-              <a:t>	conditions</a:t>
-            </a:r>
+              <a:t>     </a:t>
+            </a:r>
+            <a:r>
+              <a:rPr lang="en-US" dirty="0" err="1" smtClean="0"/>
+              <a:t>strfwd.conditions</a:t>
+            </a:r>
+            <a:endParaRPr lang="en-US" dirty="0" smtClean="0"/>
           </a:p>
           <a:p>
             <a:pPr marL="0" indent="0">
@@ -13872,8 +13893,21 @@
             </a:pPr>
             <a:r>
               <a:rPr lang="en-US" dirty="0" smtClean="0"/>
-              <a:t>Move Bucket’s query and delete the Bucket</a:t>
-            </a:r>
+              <a:t>Move </a:t>
+            </a:r>
+            <a:r>
+              <a:rPr lang="en-US" dirty="0" smtClean="0"/>
+              <a:t>bucket’s </a:t>
+            </a:r>
+            <a:r>
+              <a:rPr lang="en-US" dirty="0" smtClean="0"/>
+              <a:t>query and delete the </a:t>
+            </a:r>
+            <a:r>
+              <a:rPr lang="en-US" dirty="0" smtClean="0"/>
+              <a:t>bucket</a:t>
+            </a:r>
+            <a:endParaRPr lang="en-US" dirty="0" smtClean="0"/>
           </a:p>
         </p:txBody>
       </p:sp>
@@ -14472,6 +14506,13 @@
   <p:clrMapOvr>
     <a:masterClrMapping/>
   </p:clrMapOvr>
+  <p:timing>
+    <p:tnLst>
+      <p:par>
+        <p:cTn id="1" dur="indefinite" restart="never" nodeType="tmRoot"/>
+      </p:par>
+    </p:tnLst>
+  </p:timing>
 </p:sld>
 </file>
 
@@ -14545,6 +14586,13 @@
   <p:clrMapOvr>
     <a:masterClrMapping/>
   </p:clrMapOvr>
+  <p:timing>
+    <p:tnLst>
+      <p:par>
+        <p:cTn id="1" dur="indefinite" restart="never" nodeType="tmRoot"/>
+      </p:par>
+    </p:tnLst>
+  </p:timing>
 </p:sld>
 </file>
 
@@ -14641,6 +14689,13 @@
   <p:clrMapOvr>
     <a:masterClrMapping/>
   </p:clrMapOvr>
+  <p:timing>
+    <p:tnLst>
+      <p:par>
+        <p:cTn id="1" dur="indefinite" restart="never" nodeType="tmRoot"/>
+      </p:par>
+    </p:tnLst>
+  </p:timing>
 </p:sld>
 </file>
 
@@ -14737,6 +14792,13 @@
   <p:clrMapOvr>
     <a:masterClrMapping/>
   </p:clrMapOvr>
+  <p:timing>
+    <p:tnLst>
+      <p:par>
+        <p:cTn id="1" dur="indefinite" restart="never" nodeType="tmRoot"/>
+      </p:par>
+    </p:tnLst>
+  </p:timing>
 </p:sld>
 </file>
 
@@ -14833,6 +14895,13 @@
   <p:clrMapOvr>
     <a:masterClrMapping/>
   </p:clrMapOvr>
+  <p:timing>
+    <p:tnLst>
+      <p:par>
+        <p:cTn id="1" dur="indefinite" restart="never" nodeType="tmRoot"/>
+      </p:par>
+    </p:tnLst>
+  </p:timing>
 </p:sld>
 </file>
 
@@ -14929,6 +14998,13 @@
   <p:clrMapOvr>
     <a:masterClrMapping/>
   </p:clrMapOvr>
+  <p:timing>
+    <p:tnLst>
+      <p:par>
+        <p:cTn id="1" dur="indefinite" restart="never" nodeType="tmRoot"/>
+      </p:par>
+    </p:tnLst>
+  </p:timing>
 </p:sld>
 </file>
 
@@ -15558,6 +15634,13 @@
   <p:clrMapOvr>
     <a:masterClrMapping/>
   </p:clrMapOvr>
+  <p:timing>
+    <p:tnLst>
+      <p:par>
+        <p:cTn id="1" dur="indefinite" restart="never" nodeType="tmRoot"/>
+      </p:par>
+    </p:tnLst>
+  </p:timing>
 </p:sld>
 </file>
 
@@ -15657,7 +15740,15 @@
           <a:p>
             <a:r>
               <a:rPr lang="nl-NL" dirty="0" smtClean="0"/>
-              <a:t>Experiment Bucket Elimination and graph types</a:t>
+              <a:t>Experiment bucket </a:t>
+            </a:r>
+            <a:r>
+              <a:rPr lang="nl-NL" dirty="0"/>
+              <a:t>e</a:t>
+            </a:r>
+            <a:r>
+              <a:rPr lang="nl-NL" dirty="0" smtClean="0"/>
+              <a:t>limination and graph types</a:t>
             </a:r>
           </a:p>
           <a:p>
@@ -15675,6 +15766,13 @@
   <p:clrMapOvr>
     <a:masterClrMapping/>
   </p:clrMapOvr>
+  <p:timing>
+    <p:tnLst>
+      <p:par>
+        <p:cTn id="1" dur="indefinite" restart="never" nodeType="tmRoot"/>
+      </p:par>
+    </p:tnLst>
+  </p:timing>
 </p:sld>
 </file>
 
@@ -15737,6 +15835,123 @@
           </a:p>
         </p:txBody>
       </p:sp>
+      <p:sp>
+        <p:nvSpPr>
+          <p:cNvPr id="4" name="AutoShape 2" descr="data:image/jpeg;base64,/9j/4AAQSkZJRgABAQAAAQABAAD/2wCEAAkGBxMTEhIUExIVFBUUFRcUFxgXFBUZFRcVGBQXFxUUFxQYHSggHBolHRQWITEhJSosLi4uFx8zODMsNygtLisBCgoKDg0OGxAQGywkICQvLC8yOCwvLCwsLywtLDQsLCwvLC0sLCwvLSwsLCwsLCwsLCwsLCwsLCwsLCwsLCwsLP/AABEIAOEA4QMBIgACEQEDEQH/xAAcAAEAAQUBAQAAAAAAAAAAAAAABgEDBAUHAgj/xABJEAABAwIDBQUEBgUJCAMAAAABAAIDBBEFEiEGEzFBUQcyYXGRIoGhsRRCUsHR8CMkYnKSFjU2dIKisrPxMzRDU3O0wtIVdYP/xAAcAQABBQEBAQAAAAAAAAAAAAAAAQIEBQYDBwj/xAAzEQACAgEDAgMFBwQDAAAAAAAAAQIDEQQSIQUxQVFhEyIycdEGFFKBkbHhI0KhwRUzNP/aAAwDAQACEQMRAD8AyCUuqFFkTelbpdURAC6XREALpdEQAuq3VEQBn4LLaUD7QI+8fJSG6iUMmVzXdCD6FSwFSanwZXrtW26M/NfsVul1RF0KMrdLqiIArdLqiIArdLqiIArdLqiIArdLqiIArdLqiIArdLqiIAvXRESAQoohRQz0YIiIAIiIAIsfEqgxwzSN7zI3Ob52sD7r39yg1DtXUtN3uEjTyc0fAtAIUqnSyti5Ih362FM1GXidBRYWEYnHUNuzRw7zD3h4+I8VmrhOEoPEkSa7I2LMWFJsNkzRMPhY+7T7lGVusAk0e3oQfUW+74p1T5wVXW6t2n3fhf8ABtURFIMiEREAERR3a3aplGA0APmcLtZfQD7b7cB4cSnRi5PCHRi5PCJEUBXDMRxCoqTmlme7wBs23QNGi3fZ5jkkFQ2me4mKW+UE9x/G4PQ2OnkpD03Hfk7vTtLudYREUUjBERABERABUJsqSSBouVr5py7y6J0Y5O9NDsfobH6Wzr8CqLXon7ETPucPU0RRCirTZhERABERAGLirCYJwOJik/wlQA0nsAgcl0prb6Hgbj1FvvUEidZpaeIuD7lZ6KWINepSdUj76foaWlrJIJA+Nxa4HT7wfBdGwXGY6pmZtmyDvx31/faObfkue1TAdbLGoax8MjZGOs5puD8CCOYtcKZbTG6GH3K/TamVE8+B1lZ2DSWlA+0CPvHyWjwXFmVLMzbNe3vsvw/ab1b8lsIn5XNd0IPobqlcJVzxI0Fu3U6eSj4pktRAUUgwgRF4nlaxpc4gNaLkngAlFXJg4/i7KWF8r7aD2W3sXu5NC4nVVL55XyyG73nMeQ8APC2i3O2W0BqpdD+ijJDB16uPifktXQQE/V0VhVX7OOX3JtcNq9TY0lPzVxlP+sUxA13rR6mx+az6WLKL25LX70mppwL338XD/qtTYPMiR4HZAiIoBUhERABWp5w3z6LxUVNtBx+SwSb8U+Mc9yXRpnLmXYrJIXG5XlEXUsUklhF1ERIONEUQoqs1AREQAREQAUSxmiyTydHe2PJ2p+N1LVqNqG2iZKOMbsp8WP5e4gfFTNHPbPHmV3Uq91W7yIrWRAD3LQVB1KkVbMHNuOBUbrCLlXNRmrGeqOvfGQ5jy1zTcEGx8f8ARS3DNuHHSaLMftMIaT5t4ellBmNurkbrJ1lMLPiQtOptqfuM7VR7eUYjYHPfmAAtunE9OI0+Ku/y+orE5pPLdm/4LjTJNF73lwuH3SBxkoybbXc6hiHaZA1pMcUjncg7KG+oJKg+L7XT1ZdvHZWX9mNps0eZ4n3rQSMJVixC6wohHsCaXwo2bfmpDgsJNlFaZ97X5KQU0zo2h4cDfXLfp4FJYvA6QZI3M5LB2fos2IU4vezzIfJjSR8bKk2IWFxxtf8ABbTs4gz1Ms51yx5R4F7xYD3MPqoq91NnSyWIs6MiKj3AC5UIrUslVh1FVyb6/grdRUF2g0HzVhdYw8yfRpse9MIiJ5NCIiALqIiQU0V0XtwXgs6KTf0Sa5qln5kLRfbOieI6mDi/Ncr6r/IRU9yqCqi2iyp4nFo1mm1lGpjupmpL0YREXEkharam/wBFkIF7FjvcHi59FtVi4q1pgnDzZu6fcnoWkLrQ8WR+Zw1KTpkn5M5/V1Ps8Br06rSuFzdVY42sV7AWkisGLbyN0vZpxbxVqV5Xuml5Jwh63aq1lrq7ZYtS9IB6adUfFdWGFZI87+9D4A8BuiuUkhzAHUHqfvVHusrRk425oxlCm7qXkA3IA69fLwXQuyqiy0jpT/xpCW/uMu0fHMfeuQSzuc0Bdn7P8TDsPgAHtRgxHpdp4+ViFE1EWq+AlumtqJTLKGjVa+aUuOvovL3km5XlQ4xwSqaFXy+4RETiQEREAEREAXUREgppSiFFrTysLyWhekSSipLDWR9ds6pboNp+nB4ylUv7lcRVl/SKLOY+6/Tt+hp9F9rdbRxbia9eH+q/2meFrtowPotRm/5Zt+9cZP71lssnuWBjjGmnnz93duN+hAu0+dwFVS6XdTNS7pPw+hqqPtNotZW4Z2yaxiXn6Pt+xyx5W8iwRjYTPM5wjD2xgNHtOcQHOsD0BWicphg9RDVUT6OWVsUjZN9BI8gMJLQ10bnHQcOfXwUvUSlCKa7ZWfkVsMZNFHhJkY97NWtLsvtNzEN6szFw0IN+HK5Wpj0cpxh2F/QWTSTSxulcwsjjZI117nV2nLQa9FCp++fzcpard8pY7BJYRlFwsVYijLivLHaEFZGHyAH8+5dnwhESCowyOko4JTG2WaqBLXO1bE0EOBa3gXWFtftHotzs3h1LWGSB5bJII96yWON0ZaRlBabgXsX24WIB4hYWHYhTTUrKStc6PdEmGZrb5QfquaNfgeCu0eK0WHxStpXvqZ5RlMjmljGjW1gQCQL305qpsnbKEoYe/PDXbGeHnthLwOqwnnPBE8ZjaHNygA5RmH7QJB+S14Zqrkj7leX3urWKwsHFvJ70XWdhR+ow6W7/AK53XK5DmXZdkLfQqe32Pjc3C46n4Tvp/iNuiIoJMCIiACIiACIiALqIiQU0pRCi1p5WEREAEREAFqNrP90l/sj1cPwW3Wt2ngL6OoA4hrX/AMLgT8Lrlf8A9bJnT8feYZ8zlbyqRO10KtFyoFXG0NiyVY0bL3815EiuRTgaFGAKSN0VlqyzUNIsBc/FWo2oAuSOJAK8Bt+KqXDqrWY8kgFbr2w6Kzqq5kohVq6r2dy3pLfZkcPUA/nzXJXOXYNhMPMNI3NxkO943sCAGjzsFw1Pwnehe8SFERQCaEREAEREAEREAXUREgppSiFFrTysIiIAIiIAILagi4III6gixHoURI1lYYsZOLTXgck2hwswzvZY2DvZ8W8Wm/ktc0a8fRdY2gwdtSy2X2xezudrE2P55rmtbQuhNi0jxsqqS2ScGbfS3q+pWLx/cw3pfMvL3rw2RKSD2CRceqqx+i8kjqredAF9r1dB5/6LHjcshsgSAUPhqrTj1Cubsk2AJ8lKdmNi56lwztLWdT934pspxissVLJosBwp08zGNBILhfTgOZ9F26KINa1rdGtAaPICwUXxqlGEvpC1oLHiVsnVwBhsfBwzHhxUmpqhkjQ+Nwc12oI/OhUK2e/DXYl0pIuIiLgdwiIgAiIgAiIgC6iIkFNKUQotaeVhERABERABEQBAGxwaJj3mMn2zG6RrerQ5oJ9SFgY3gbZLktuD1ChWK7RyU2JCaM33JDMt9HRgWfGT46++x5LuFJuquGOeH2mSNDgba+II5EG4I6hUerjv/qI3Gjr9hVGHocExPYx1zuz7io7PgE7blzbAc19IS7Llx6Li3aBjce/fTROuInAFw4OkafaHkDoolV17nsJrUcZIacPk6Kn0KQclIqQOka3JqTy6HopbgeyDzZ8h0uPZ5Lv95aeHjI1xWMnP8N2cqJjZjCSBe3O3X5eoUqwns0qHkZwRddZpMOZTMEzALs9qx4lv12e8X99lN4Mr2te2xa4BwI5gi4PoVEr1V1+dnGHge4xjh9zmeznZnHFZzhmcNdfkpxSYe1g0Fh5ahbjKsers1rnPeGMAJcTYAADUknQJdk/7uRu44124VI/VYh3ryyHwADGAeRJd/AodshjroHGPNZsnC49kP5E+fBZHaLtEytq3PjH6NjREy/FzWlxLz+8XE+VlFWO196mV1/09rFjZtmpI61TbQt4SNLTwuNR6cfmttBUMeLscHDwPzHJQWR17HmWgm3C5GtvBGPINwSD1BsfVQmsPBsZdKqugp1vblZ80T5FFaXH5W96zx46O9R94W4pcbifxOQ9HcP4uCQq7+m6irlrK9OTZIgPNEEAIiIAuoiJBTSlEKLWnlYREQAREQAXqLvN8x815Wpr8aDHBrNSCLniBrqB1KMN8IlaPS2aixRgv4Oe48688p/bd8yuodgW0Bzz0TjoRv4h4ggStHS92n3FcsxlmWeUdHu5359UwDHZaKojqISM7L2uLtIcLOa4cwQVVQxtwzbSPo3tP2pFBQvcDaeUGOFvE5iNXnwaLnzsOa+VHuJNyTcm9+ZPW6kW2O1E+ITb6ci4GVrW3DGN42aCTxPE89FH3NCbXBRA6TsA1ofC51iyoBZf7FQyxcw9M7HMeOtz0K7FRQC1raLjOxmAyyRU7S4sbO8PBy3dGYi50b26jUh7xfo6y6PiW0T2yilgb9IkDbyPj9gR8OJJIueeqqepQUp5h3H1Zxhml7RdrDSRyRMIL5Blbr3NNXW963PYJtNv6N1K915KXRt+Jhd3f4TdvllXIO0yhljq7yvztkYHxm1gBwcy3UOBHjoea1Oye0ctBUx1EJ9pmhaeD2HvMPgR6EA8lZaOEfZ7uMyw8+oyWVx5H2K54AJJAAFyToABxJXz32qdohrHGCndamadSP+MR9Y/sDkOfHpbYdpHazDVUe4o9410tt6XNy2Za5jBvrc2Btpa/VccMt10ab7gZe8XuB2vVYYesunSsCa0VUJI2EC2UZSOlleWiwSrDbtPA29x4A+S3qrro7ZG86NqVdpks8x4f+giIuRbF+mq3x9xxb4cveOC3FJtGeEjL+Lf/AFP4rQIgjX6Om744/Um9LXxydx4J6cD6FZK5+s+kxiVn1sw6O1+PFBT39Fa5ql+T+pNkUb/lM7/lN/iP4Igh/wDE6r8P+UZRRCi1h40EREAFRzgASTYDiSrdRUNY0ucbD86AdVF8SxJ0ptwZyHXxd4p0YuXYsun9Ms1cs9o+L+hlYrjBddsZs3m7m7y6Bahg1HmqK5FYAvd3Wanx6N96kPbXFs22n01Wmr2VrCI3jL71Ex/bI9DZa2ZqvyyFznOPFziT5k3VmUrPkdmO5bLZLBHVlXDA3g93tHpGNXu9AfeQta5q6J2aSsooZKstDppS6KFpNgI2AGWZx5Rg2uf2LDUhJOTUW49xCZbYBtKxscbzGLWuBd4j7o3Q4GQgCMX568iVtdlNn3wuZPI3d5mFscA1ELHlrnF7zq+Vxa0ue7XTpotVsvhslZIK2pJIB/QNc2wJ1/TFn1RrZreQ4kkknoc8wEd3cupGvv8AvWb1uo2VumD5/ufn6EmqHO5nPu2jAhNS72MAyU53h0FzGRZ7b+jtb90DmuAL6ixKotE4E+1ICLeB0cfmLcv7K+bdoMP3FRLFya45fFh1afQhT+jWS9m4Psuw29LOTX5kBVF6aVcnAvxrMiOmiwmFZkBumsUuRSlpBCmGHTZowfz5KHALfbMzDM6O/eF2+YXC6O6JZ9J1XsNTF+D4f5m8REVeb8IiIAIiIA9IiIHkpKIUWsPmoLEr69sQudSeDRxP4DxWPimLCO7W+0/4N8/HwUalkLiXONyeJK6Qr3cvsX3TejSuxZdxHy8X/BcrKt0jruPkOQ8lYRFJSS4RsIQjCKjFYSC1+0U5AZHfgMxH7Rvx91luKJvtZj3We0fIfkKI4hPme4kk3JNyq3X29q18zldLjBYurLnK5mWPMSq8jFHOXW9gtkxNHGZGkU4yuOYWdUPBzBtvqwNdcgfWNyfDlOFxbyaJhGj5GNt+88A/NfW8kDQxosGta0AaaBoHDyVd1PVSoqxHxH1QTfJgPcGDoB+QAB8lrpcR+s/Ro0AuLjjYDjqbfDoPa1+K4iQTn0Y2/HXwv4nlbjy+1ljs2IuleLXt9UDx4nTS5sNfwCpNLop3ywvEk3XRhHLNxK8vc5x56AcgOQHgoB2sYHZkNU0aF24d1Jyl7T5aOF10vZ/DS8+0crGi73dB081i9qeFCfDZyxuXdBs0bNBaNhGeR3i5pdYLRpQ0+2qPPmVsJStlvfY+ckXp6oFLOpdYs2JvNYkazIhomsUoXarJo5S1wcDq0ghYsoV2FIwRPHODrOHBwDvXiPVeViYHPngseMTg3+y65HyKy1WWR2yaPRenaj2+mjPx7P5oIiJhNCIiAPSIiB5KStFimNcWxHzd9zfxWLiuLGS7W3az4u8/DwWrWzhV4s8W6Z0VQxZeufBeXzCIi7mkC2WzGC/TayCmzFjH5nyObo7dsFyGnkSS0X5XJWtUs7KP51i/q8/ziXDUycam0c7XiLJudi8HdO+hFKRKIGzFwfKHZHPLAd7nzF128DooNsf2eUxxbEKKqaaiOnjY+Il8jDZ5a5pJjc25yuseVwV0Wm/pBP8A/Wxf9y9YGA/0jxP+q0/yYqUhGqwbs2wySuxGF1KTHD9G3bd/UDLvI3OfqJLm5A43Wm2H2Cw+oxDGIZqfPHSzRshbvZhka7e3F2vBPcbxJ4Lo2zv854t5Uf8AkvUf7M/512h/rEXznQBDdtsFweGanp8OtFXiugidrUPLA4kZrSksNnFh/JXRarZ3DoZKWnmZLNLVOe1skksr3l0cZkc5z8/saN0y215Bc67YW4fDO2oo3h2JNrY3yNzSOIytc4fozp3mx8F0DCsZosbgbFURPimAzbt+eOVjwLGSCTQka8RyNnCxsUaT7gRbHcMoaTETBXTTuofou/ia6SpcWSmTI5ueE53ANZcZybZiApRiex2D0sW/lZLHGC0ZhU1xN3uDWgNZIXalwHDmoLjuyrqM10DiZrUMs0Uzr5jC1jw5kl9M7TbUaHONLrpO3LL0EIy571FF7N7Zv1mLS/JGIwXujU3JtNEf7PtnqWqgqnuNS5grahkX63Ws/QNcNyCzeA90jvC/VWtgsK/+Rhe+rklfBE91OyEyvAkMfflncDmk45Q1xIAbwJJUq2AHsVurT+uy90Wb3I+6Oi1fY7/N8v8AWqn/ADCmpKSUsDiObR7BYZXYZJWUMBge2OV8ZbdufcueHMdGTl1LHAHxB8Fh7DdmlDWYMyUwfrUscobJvZRaQOe2N2TPk0s3Sylmwv8AR/8A/Gs/zZ1e7HZmswWkLjYe2LnxncB8SE8Dnz9hqFuzv0005FUIcxeZJrh+9ym8efLw0tZSLCdhsLocPhqK2n38kjYd452Z9nzFoDWMuGhoL+Nr2HM6KR9ptI2LBa5jNG5XOt0L5w8jyu4rSdn+2FPW0cVFXRFj92yL9KxwhnAADHNkIsHmzTbQ37vgARTte7PqelNI+jaYhUTinMZc5zA9+rHNzEkcDccOFrKZfyCwmiFJBLS/SH1Mm43jyS7Pu3PLjqA0ewRZo5+9QPtU2EfRSQSwzyugmmaxofI9z4JSbtLXX1FgbHiLWub3Uzwjs0rYayjnkxJ9WyGUvcyXeiw3bmhzA6R4Ju4DloeKAI/tZstHh9Q6KHNuZ49+xrnFxY6J4ZIzMdS20zCL3PFaBT3tanBrqKNrmlzaepc5t9cr3QhuniWOt+6VAlX6pYmbX7PWbtM4+T/cIiKMXwREQB6REQPNaUQot0edBERABbjY3GmUddBPLpEA+KRwBORsjRZ9hyDmtv4EladEyyG+LiNlHcsHe6WKB1TLikVQ2aM0ggIiG87kjpS4FhJcbOAygX9VzfZ/bmFu0FZLUB1NFURsiYZmmMtyNZkc8O7rXZXEE8Li6hs+0tZh7jHSVD4Wvs+RobG5pkygFwD2mxsGg26BRXGMYmqpnTVEhkkcAHOIaLhosNGgDgFQvCbSILWHg+popKalmrK2SriEdQISbuaGtETC3R1/avm5D1UC7Ito4JK3Gp3yMibPNE+PePawluaexs4jWxF/NcKyjoPRW3pMiHa+0jA8OhkdisVWZZxVQSmJs0LmECRmbKxozcG9V0Kd9LiD6CrhrI8lNI6WwLSXZ4iwsddwLCL63HUL5PLV4clA7T2wbb07qndQS7xoo6iCR0RaW55bZWF3MAxi9vtW6hTXtD2jpmYa1zZopDHLSyFjJWF5DJ43EAA9AV8vqt0jSawB9MdkW08UlHNLPNDE+WqleWGRrbAhgFg43tYcVrexfaymDKmjklZHIKmV7A5wAkY839gnQkEHTpYr54RCSSwgPpzGMSpcIwd9M6pjkk3U7YmggPe+Vz3D9GHE5QZBc9AtDgOLxM2Xc0TxtmEExa3eNEgdvXFtm3vfgVwIKrRqlA+mNutpqeqwKd7Zos81PG/d7xmcOcWEtyXvcG4t4LzhNVTYvg0FMyrZFK2OmbINM7HwOjLv0ZcDYmM2PjfVfNoCyImg8gkyB3jtu2kpnRU1JHO10v0mJ78jmuMTG39px1AN3NsD4la/tYr3wQ0z4MXmneJyLCSlBaDE+7r08bHdBqSNeC41I0DSysN4oyBuo8ReZt86R75CQ4ve4ucfMnX3KZ1BByvGge0Ot0J4/Fc+Yp3AQYKcg6ZMvvadfmompXu5L/7P2NanbnhphFk/QJPs/wB5v4p9Bk+z/eb+Piom1+Rr/b1/iX6oxkWR9Bk19nhb6zefDnzsgo3n6vDTvN6A9ehHqja/IX21f4l+pZResniPUKqNr8h3t6vxL9TWIiLcmACIiBArlN32/vD5oiR9gZpdrf8AalRt3FEWaj2ID7l5WFRE4QK2fu/BVRKIW0REoBERAFQvQREAXFfgRE0U91SxgiIQGwp+CnGD/wC5s/6rv8IRFH1Hwlt0P/2R/P8AYxpeLv3vvKyZv9jF5yf+CIuK7Ght+JfMxWcvNv8AhKcm+R+RRE0ei4iInCH/2Q=="/>
+          <p:cNvSpPr>
+            <a:spLocks noChangeAspect="1" noChangeArrowheads="1"/>
+          </p:cNvSpPr>
+          <p:nvPr/>
+        </p:nvSpPr>
+        <p:spPr bwMode="auto">
+          <a:xfrm>
+            <a:off x="155575" y="-144463"/>
+            <a:ext cx="304800" cy="304801"/>
+          </a:xfrm>
+          <a:prstGeom prst="rect">
+            <a:avLst/>
+          </a:prstGeom>
+          <a:noFill/>
+          <a:extLst>
+            <a:ext uri="{909E8E84-426E-40DD-AFC4-6F175D3DCCD1}">
+              <a14:hiddenFill xmlns:a14="http://schemas.microsoft.com/office/drawing/2010/main">
+                <a:solidFill>
+                  <a:srgbClr val="FFFFFF"/>
+                </a:solidFill>
+              </a14:hiddenFill>
+            </a:ext>
+          </a:extLst>
+        </p:spPr>
+        <p:txBody>
+          <a:bodyPr vert="horz" wrap="square" lIns="91440" tIns="45720" rIns="91440" bIns="45720" numCol="1" anchor="t" anchorCtr="0" compatLnSpc="1">
+            <a:prstTxWarp prst="textNoShape">
+              <a:avLst/>
+            </a:prstTxWarp>
+          </a:bodyPr>
+          <a:lstStyle/>
+          <a:p>
+            <a:endParaRPr lang="nl-NL"/>
+          </a:p>
+        </p:txBody>
+      </p:sp>
+      <p:sp>
+        <p:nvSpPr>
+          <p:cNvPr id="5" name="AutoShape 4" descr="data:image/jpeg;base64,/9j/4AAQSkZJRgABAQAAAQABAAD/2wCEAAkGBxMTEhIUExIVFBUUFRcUFxgXFBUZFRcVGBQXFxUUFxQYHSggHBolHRQWITEhJSosLi4uFx8zODMsNygtLisBCgoKDg0OGxAQGywkICQvLC8yOCwvLCwsLywtLDQsLCwvLC0sLCwvLSwsLCwsLCwsLCwsLCwsLCwsLCwsLCwsLP/AABEIAOEA4QMBIgACEQEDEQH/xAAcAAEAAQUBAQAAAAAAAAAAAAAABgEDBAUHAgj/xABJEAABAwIDBQUEBgUJCAMAAAABAAIDBBEFEiEGEzFBUQcyYXGRIoGhsRRCUsHR8CMkYnKSFjU2dIKisrPxMzRDU3O0wtIVdYP/xAAcAQABBQEBAQAAAAAAAAAAAAAAAQIEBQYDBwj/xAAzEQACAgEDAgMFBwQDAAAAAAAAAQIDEQQSIQUxQVFhEyIycdEGFFKBkbHhI0KhwRUzNP/aAAwDAQACEQMRAD8AyCUuqFFkTelbpdURAC6XREALpdEQAuq3VEQBn4LLaUD7QI+8fJSG6iUMmVzXdCD6FSwFSanwZXrtW26M/NfsVul1RF0KMrdLqiIArdLqiIArdLqiIArdLqiIArdLqiIArdLqiIArdLqiIAvXRESAQoohRQz0YIiIAIiIAIsfEqgxwzSN7zI3Ob52sD7r39yg1DtXUtN3uEjTyc0fAtAIUqnSyti5Ih362FM1GXidBRYWEYnHUNuzRw7zD3h4+I8VmrhOEoPEkSa7I2LMWFJsNkzRMPhY+7T7lGVusAk0e3oQfUW+74p1T5wVXW6t2n3fhf8ABtURFIMiEREAERR3a3aplGA0APmcLtZfQD7b7cB4cSnRi5PCHRi5PCJEUBXDMRxCoqTmlme7wBs23QNGi3fZ5jkkFQ2me4mKW+UE9x/G4PQ2OnkpD03Hfk7vTtLudYREUUjBERABERABUJsqSSBouVr5py7y6J0Y5O9NDsfobH6Wzr8CqLXon7ETPucPU0RRCirTZhERABERAGLirCYJwOJik/wlQA0nsAgcl0prb6Hgbj1FvvUEidZpaeIuD7lZ6KWINepSdUj76foaWlrJIJA+Nxa4HT7wfBdGwXGY6pmZtmyDvx31/faObfkue1TAdbLGoax8MjZGOs5puD8CCOYtcKZbTG6GH3K/TamVE8+B1lZ2DSWlA+0CPvHyWjwXFmVLMzbNe3vsvw/ab1b8lsIn5XNd0IPobqlcJVzxI0Fu3U6eSj4pktRAUUgwgRF4nlaxpc4gNaLkngAlFXJg4/i7KWF8r7aD2W3sXu5NC4nVVL55XyyG73nMeQ8APC2i3O2W0BqpdD+ijJDB16uPifktXQQE/V0VhVX7OOX3JtcNq9TY0lPzVxlP+sUxA13rR6mx+az6WLKL25LX70mppwL338XD/qtTYPMiR4HZAiIoBUhERABWp5w3z6LxUVNtBx+SwSb8U+Mc9yXRpnLmXYrJIXG5XlEXUsUklhF1ERIONEUQoqs1AREQAREQAUSxmiyTydHe2PJ2p+N1LVqNqG2iZKOMbsp8WP5e4gfFTNHPbPHmV3Uq91W7yIrWRAD3LQVB1KkVbMHNuOBUbrCLlXNRmrGeqOvfGQ5jy1zTcEGx8f8ARS3DNuHHSaLMftMIaT5t4ellBmNurkbrJ1lMLPiQtOptqfuM7VR7eUYjYHPfmAAtunE9OI0+Ku/y+orE5pPLdm/4LjTJNF73lwuH3SBxkoybbXc6hiHaZA1pMcUjncg7KG+oJKg+L7XT1ZdvHZWX9mNps0eZ4n3rQSMJVixC6wohHsCaXwo2bfmpDgsJNlFaZ97X5KQU0zo2h4cDfXLfp4FJYvA6QZI3M5LB2fos2IU4vezzIfJjSR8bKk2IWFxxtf8ABbTs4gz1Ms51yx5R4F7xYD3MPqoq91NnSyWIs6MiKj3AC5UIrUslVh1FVyb6/grdRUF2g0HzVhdYw8yfRpse9MIiJ5NCIiALqIiQU0V0XtwXgs6KTf0Sa5qln5kLRfbOieI6mDi/Ncr6r/IRU9yqCqi2iyp4nFo1mm1lGpjupmpL0YREXEkharam/wBFkIF7FjvcHi59FtVi4q1pgnDzZu6fcnoWkLrQ8WR+Zw1KTpkn5M5/V1Ps8Br06rSuFzdVY42sV7AWkisGLbyN0vZpxbxVqV5Xuml5Jwh63aq1lrq7ZYtS9IB6adUfFdWGFZI87+9D4A8BuiuUkhzAHUHqfvVHusrRk425oxlCm7qXkA3IA69fLwXQuyqiy0jpT/xpCW/uMu0fHMfeuQSzuc0Bdn7P8TDsPgAHtRgxHpdp4+ViFE1EWq+AlumtqJTLKGjVa+aUuOvovL3km5XlQ4xwSqaFXy+4RETiQEREAEREAXUREgppSiFFrTysLyWhekSSipLDWR9ds6pboNp+nB4ylUv7lcRVl/SKLOY+6/Tt+hp9F9rdbRxbia9eH+q/2meFrtowPotRm/5Zt+9cZP71lssnuWBjjGmnnz93duN+hAu0+dwFVS6XdTNS7pPw+hqqPtNotZW4Z2yaxiXn6Pt+xyx5W8iwRjYTPM5wjD2xgNHtOcQHOsD0BWicphg9RDVUT6OWVsUjZN9BI8gMJLQ10bnHQcOfXwUvUSlCKa7ZWfkVsMZNFHhJkY97NWtLsvtNzEN6szFw0IN+HK5Wpj0cpxh2F/QWTSTSxulcwsjjZI117nV2nLQa9FCp++fzcpard8pY7BJYRlFwsVYijLivLHaEFZGHyAH8+5dnwhESCowyOko4JTG2WaqBLXO1bE0EOBa3gXWFtftHotzs3h1LWGSB5bJII96yWON0ZaRlBabgXsX24WIB4hYWHYhTTUrKStc6PdEmGZrb5QfquaNfgeCu0eK0WHxStpXvqZ5RlMjmljGjW1gQCQL305qpsnbKEoYe/PDXbGeHnthLwOqwnnPBE8ZjaHNygA5RmH7QJB+S14Zqrkj7leX3urWKwsHFvJ70XWdhR+ow6W7/AK53XK5DmXZdkLfQqe32Pjc3C46n4Tvp/iNuiIoJMCIiACIiACIiALqIiQU0pRCi1p5WEREAEREAFqNrP90l/sj1cPwW3Wt2ngL6OoA4hrX/AMLgT8Lrlf8A9bJnT8feYZ8zlbyqRO10KtFyoFXG0NiyVY0bL3815EiuRTgaFGAKSN0VlqyzUNIsBc/FWo2oAuSOJAK8Bt+KqXDqrWY8kgFbr2w6Kzqq5kohVq6r2dy3pLfZkcPUA/nzXJXOXYNhMPMNI3NxkO943sCAGjzsFw1Pwnehe8SFERQCaEREAEREAEREAXUREgppSiFFrTysIiIAIiIAILagi4III6gixHoURI1lYYsZOLTXgck2hwswzvZY2DvZ8W8Wm/ktc0a8fRdY2gwdtSy2X2xezudrE2P55rmtbQuhNi0jxsqqS2ScGbfS3q+pWLx/cw3pfMvL3rw2RKSD2CRceqqx+i8kjqredAF9r1dB5/6LHjcshsgSAUPhqrTj1Cubsk2AJ8lKdmNi56lwztLWdT934pspxissVLJosBwp08zGNBILhfTgOZ9F26KINa1rdGtAaPICwUXxqlGEvpC1oLHiVsnVwBhsfBwzHhxUmpqhkjQ+Nwc12oI/OhUK2e/DXYl0pIuIiLgdwiIgAiIgAiIgC6iIkFNKUQotaeVhERABERABEQBAGxwaJj3mMn2zG6RrerQ5oJ9SFgY3gbZLktuD1ChWK7RyU2JCaM33JDMt9HRgWfGT46++x5LuFJuquGOeH2mSNDgba+II5EG4I6hUerjv/qI3Gjr9hVGHocExPYx1zuz7io7PgE7blzbAc19IS7Llx6Li3aBjce/fTROuInAFw4OkafaHkDoolV17nsJrUcZIacPk6Kn0KQclIqQOka3JqTy6HopbgeyDzZ8h0uPZ5Lv95aeHjI1xWMnP8N2cqJjZjCSBe3O3X5eoUqwns0qHkZwRddZpMOZTMEzALs9qx4lv12e8X99lN4Mr2te2xa4BwI5gi4PoVEr1V1+dnGHge4xjh9zmeznZnHFZzhmcNdfkpxSYe1g0Fh5ahbjKsers1rnPeGMAJcTYAADUknQJdk/7uRu44124VI/VYh3ryyHwADGAeRJd/AodshjroHGPNZsnC49kP5E+fBZHaLtEytq3PjH6NjREy/FzWlxLz+8XE+VlFWO196mV1/09rFjZtmpI61TbQt4SNLTwuNR6cfmttBUMeLscHDwPzHJQWR17HmWgm3C5GtvBGPINwSD1BsfVQmsPBsZdKqugp1vblZ80T5FFaXH5W96zx46O9R94W4pcbifxOQ9HcP4uCQq7+m6irlrK9OTZIgPNEEAIiIAuoiJBTSlEKLWnlYREQAREQAXqLvN8x815Wpr8aDHBrNSCLniBrqB1KMN8IlaPS2aixRgv4Oe48688p/bd8yuodgW0Bzz0TjoRv4h4ggStHS92n3FcsxlmWeUdHu5359UwDHZaKojqISM7L2uLtIcLOa4cwQVVQxtwzbSPo3tP2pFBQvcDaeUGOFvE5iNXnwaLnzsOa+VHuJNyTcm9+ZPW6kW2O1E+ITb6ci4GVrW3DGN42aCTxPE89FH3NCbXBRA6TsA1ofC51iyoBZf7FQyxcw9M7HMeOtz0K7FRQC1raLjOxmAyyRU7S4sbO8PBy3dGYi50b26jUh7xfo6y6PiW0T2yilgb9IkDbyPj9gR8OJJIueeqqepQUp5h3H1Zxhml7RdrDSRyRMIL5Blbr3NNXW963PYJtNv6N1K915KXRt+Jhd3f4TdvllXIO0yhljq7yvztkYHxm1gBwcy3UOBHjoea1Oye0ctBUx1EJ9pmhaeD2HvMPgR6EA8lZaOEfZ7uMyw8+oyWVx5H2K54AJJAAFyToABxJXz32qdohrHGCndamadSP+MR9Y/sDkOfHpbYdpHazDVUe4o9410tt6XNy2Za5jBvrc2Btpa/VccMt10ab7gZe8XuB2vVYYesunSsCa0VUJI2EC2UZSOlleWiwSrDbtPA29x4A+S3qrro7ZG86NqVdpks8x4f+giIuRbF+mq3x9xxb4cveOC3FJtGeEjL+Lf/AFP4rQIgjX6Om744/Um9LXxydx4J6cD6FZK5+s+kxiVn1sw6O1+PFBT39Fa5ql+T+pNkUb/lM7/lN/iP4Igh/wDE6r8P+UZRRCi1h40EREAFRzgASTYDiSrdRUNY0ucbD86AdVF8SxJ0ptwZyHXxd4p0YuXYsun9Ms1cs9o+L+hlYrjBddsZs3m7m7y6Bahg1HmqK5FYAvd3Wanx6N96kPbXFs22n01Wmr2VrCI3jL71Ex/bI9DZa2ZqvyyFznOPFziT5k3VmUrPkdmO5bLZLBHVlXDA3g93tHpGNXu9AfeQta5q6J2aSsooZKstDppS6KFpNgI2AGWZx5Rg2uf2LDUhJOTUW49xCZbYBtKxscbzGLWuBd4j7o3Q4GQgCMX568iVtdlNn3wuZPI3d5mFscA1ELHlrnF7zq+Vxa0ue7XTpotVsvhslZIK2pJIB/QNc2wJ1/TFn1RrZreQ4kkknoc8wEd3cupGvv8AvWb1uo2VumD5/ufn6EmqHO5nPu2jAhNS72MAyU53h0FzGRZ7b+jtb90DmuAL6ixKotE4E+1ICLeB0cfmLcv7K+bdoMP3FRLFya45fFh1afQhT+jWS9m4Psuw29LOTX5kBVF6aVcnAvxrMiOmiwmFZkBumsUuRSlpBCmGHTZowfz5KHALfbMzDM6O/eF2+YXC6O6JZ9J1XsNTF+D4f5m8REVeb8IiIAIiIA9IiIHkpKIUWsPmoLEr69sQudSeDRxP4DxWPimLCO7W+0/4N8/HwUalkLiXONyeJK6Qr3cvsX3TejSuxZdxHy8X/BcrKt0jruPkOQ8lYRFJSS4RsIQjCKjFYSC1+0U5AZHfgMxH7Rvx91luKJvtZj3We0fIfkKI4hPme4kk3JNyq3X29q18zldLjBYurLnK5mWPMSq8jFHOXW9gtkxNHGZGkU4yuOYWdUPBzBtvqwNdcgfWNyfDlOFxbyaJhGj5GNt+88A/NfW8kDQxosGta0AaaBoHDyVd1PVSoqxHxH1QTfJgPcGDoB+QAB8lrpcR+s/Ro0AuLjjYDjqbfDoPa1+K4iQTn0Y2/HXwv4nlbjy+1ljs2IuleLXt9UDx4nTS5sNfwCpNLop3ywvEk3XRhHLNxK8vc5x56AcgOQHgoB2sYHZkNU0aF24d1Jyl7T5aOF10vZ/DS8+0crGi73dB081i9qeFCfDZyxuXdBs0bNBaNhGeR3i5pdYLRpQ0+2qPPmVsJStlvfY+ckXp6oFLOpdYs2JvNYkazIhomsUoXarJo5S1wcDq0ghYsoV2FIwRPHODrOHBwDvXiPVeViYHPngseMTg3+y65HyKy1WWR2yaPRenaj2+mjPx7P5oIiJhNCIiAPSIiB5KStFimNcWxHzd9zfxWLiuLGS7W3az4u8/DwWrWzhV4s8W6Z0VQxZeufBeXzCIi7mkC2WzGC/TayCmzFjH5nyObo7dsFyGnkSS0X5XJWtUs7KP51i/q8/ziXDUycam0c7XiLJudi8HdO+hFKRKIGzFwfKHZHPLAd7nzF128DooNsf2eUxxbEKKqaaiOnjY+Il8jDZ5a5pJjc25yuseVwV0Wm/pBP8A/Wxf9y9YGA/0jxP+q0/yYqUhGqwbs2wySuxGF1KTHD9G3bd/UDLvI3OfqJLm5A43Wm2H2Cw+oxDGIZqfPHSzRshbvZhka7e3F2vBPcbxJ4Lo2zv854t5Uf8AkvUf7M/512h/rEXznQBDdtsFweGanp8OtFXiugidrUPLA4kZrSksNnFh/JXRarZ3DoZKWnmZLNLVOe1skksr3l0cZkc5z8/saN0y215Bc67YW4fDO2oo3h2JNrY3yNzSOIytc4fozp3mx8F0DCsZosbgbFURPimAzbt+eOVjwLGSCTQka8RyNnCxsUaT7gRbHcMoaTETBXTTuofou/ia6SpcWSmTI5ueE53ANZcZybZiApRiex2D0sW/lZLHGC0ZhU1xN3uDWgNZIXalwHDmoLjuyrqM10DiZrUMs0Uzr5jC1jw5kl9M7TbUaHONLrpO3LL0EIy571FF7N7Zv1mLS/JGIwXujU3JtNEf7PtnqWqgqnuNS5grahkX63Ws/QNcNyCzeA90jvC/VWtgsK/+Rhe+rklfBE91OyEyvAkMfflncDmk45Q1xIAbwJJUq2AHsVurT+uy90Wb3I+6Oi1fY7/N8v8AWqn/ADCmpKSUsDiObR7BYZXYZJWUMBge2OV8ZbdufcueHMdGTl1LHAHxB8Fh7DdmlDWYMyUwfrUscobJvZRaQOe2N2TPk0s3Sylmwv8AR/8A/Gs/zZ1e7HZmswWkLjYe2LnxncB8SE8Dnz9hqFuzv0005FUIcxeZJrh+9ym8efLw0tZSLCdhsLocPhqK2n38kjYd452Z9nzFoDWMuGhoL+Nr2HM6KR9ptI2LBa5jNG5XOt0L5w8jyu4rSdn+2FPW0cVFXRFj92yL9KxwhnAADHNkIsHmzTbQ37vgARTte7PqelNI+jaYhUTinMZc5zA9+rHNzEkcDccOFrKZfyCwmiFJBLS/SH1Mm43jyS7Pu3PLjqA0ewRZo5+9QPtU2EfRSQSwzyugmmaxofI9z4JSbtLXX1FgbHiLWub3Uzwjs0rYayjnkxJ9WyGUvcyXeiw3bmhzA6R4Ju4DloeKAI/tZstHh9Q6KHNuZ49+xrnFxY6J4ZIzMdS20zCL3PFaBT3tanBrqKNrmlzaepc5t9cr3QhuniWOt+6VAlX6pYmbX7PWbtM4+T/cIiKMXwREQB6REQPNaUQot0edBERABbjY3GmUddBPLpEA+KRwBORsjRZ9hyDmtv4EladEyyG+LiNlHcsHe6WKB1TLikVQ2aM0ggIiG87kjpS4FhJcbOAygX9VzfZ/bmFu0FZLUB1NFURsiYZmmMtyNZkc8O7rXZXEE8Li6hs+0tZh7jHSVD4Wvs+RobG5pkygFwD2mxsGg26BRXGMYmqpnTVEhkkcAHOIaLhosNGgDgFQvCbSILWHg+popKalmrK2SriEdQISbuaGtETC3R1/avm5D1UC7Ito4JK3Gp3yMibPNE+PePawluaexs4jWxF/NcKyjoPRW3pMiHa+0jA8OhkdisVWZZxVQSmJs0LmECRmbKxozcG9V0Kd9LiD6CrhrI8lNI6WwLSXZ4iwsddwLCL63HUL5PLV4clA7T2wbb07qndQS7xoo6iCR0RaW55bZWF3MAxi9vtW6hTXtD2jpmYa1zZopDHLSyFjJWF5DJ43EAA9AV8vqt0jSawB9MdkW08UlHNLPNDE+WqleWGRrbAhgFg43tYcVrexfaymDKmjklZHIKmV7A5wAkY839gnQkEHTpYr54RCSSwgPpzGMSpcIwd9M6pjkk3U7YmggPe+Vz3D9GHE5QZBc9AtDgOLxM2Xc0TxtmEExa3eNEgdvXFtm3vfgVwIKrRqlA+mNutpqeqwKd7Zos81PG/d7xmcOcWEtyXvcG4t4LzhNVTYvg0FMyrZFK2OmbINM7HwOjLv0ZcDYmM2PjfVfNoCyImg8gkyB3jtu2kpnRU1JHO10v0mJ78jmuMTG39px1AN3NsD4la/tYr3wQ0z4MXmneJyLCSlBaDE+7r08bHdBqSNeC41I0DSysN4oyBuo8ReZt86R75CQ4ve4ucfMnX3KZ1BByvGge0Ot0J4/Fc+Yp3AQYKcg6ZMvvadfmompXu5L/7P2NanbnhphFk/QJPs/wB5v4p9Bk+z/eb+Piom1+Rr/b1/iX6oxkWR9Bk19nhb6zefDnzsgo3n6vDTvN6A9ehHqja/IX21f4l+pZResniPUKqNr8h3t6vxL9TWIiLcmACIiBArlN32/vD5oiR9gZpdrf8AalRt3FEWaj2ID7l5WFRE4QK2fu/BVRKIW0REoBERAFQvQREAXFfgRE0U91SxgiIQGwp+CnGD/wC5s/6rv8IRFH1Hwlt0P/2R/P8AYxpeLv3vvKyZv9jF5yf+CIuK7Ght+JfMxWcvNv8AhKcm+R+RRE0ei4iInCH/2Q=="/>
+          <p:cNvSpPr>
+            <a:spLocks noChangeAspect="1" noChangeArrowheads="1"/>
+          </p:cNvSpPr>
+          <p:nvPr/>
+        </p:nvSpPr>
+        <p:spPr bwMode="auto">
+          <a:xfrm>
+            <a:off x="307975" y="7937"/>
+            <a:ext cx="304800" cy="304801"/>
+          </a:xfrm>
+          <a:prstGeom prst="rect">
+            <a:avLst/>
+          </a:prstGeom>
+          <a:noFill/>
+          <a:extLst>
+            <a:ext uri="{909E8E84-426E-40DD-AFC4-6F175D3DCCD1}">
+              <a14:hiddenFill xmlns:a14="http://schemas.microsoft.com/office/drawing/2010/main">
+                <a:solidFill>
+                  <a:srgbClr val="FFFFFF"/>
+                </a:solidFill>
+              </a14:hiddenFill>
+            </a:ext>
+          </a:extLst>
+        </p:spPr>
+        <p:txBody>
+          <a:bodyPr vert="horz" wrap="square" lIns="91440" tIns="45720" rIns="91440" bIns="45720" numCol="1" anchor="t" anchorCtr="0" compatLnSpc="1">
+            <a:prstTxWarp prst="textNoShape">
+              <a:avLst/>
+            </a:prstTxWarp>
+          </a:bodyPr>
+          <a:lstStyle/>
+          <a:p>
+            <a:endParaRPr lang="nl-NL"/>
+          </a:p>
+        </p:txBody>
+      </p:sp>
+      <p:sp>
+        <p:nvSpPr>
+          <p:cNvPr id="6" name="AutoShape 6" descr="data:image/jpeg;base64,/9j/4AAQSkZJRgABAQAAAQABAAD/2wCEAAkGBxMTEhIUExIVFBUUFRcUFxgXFBUZFRcVGBQXFxUUFxQYHSggHBolHRQWITEhJSosLi4uFx8zODMsNygtLisBCgoKDg0OGxAQGywkICQvLC8yOCwvLCwsLywtLDQsLCwvLC0sLCwvLSwsLCwsLCwsLCwsLCwsLCwsLCwsLCwsLP/AABEIAOEA4QMBIgACEQEDEQH/xAAcAAEAAQUBAQAAAAAAAAAAAAAABgEDBAUHAgj/xABJEAABAwIDBQUEBgUJCAMAAAABAAIDBBEFEiEGEzFBUQcyYXGRIoGhsRRCUsHR8CMkYnKSFjU2dIKisrPxMzRDU3O0wtIVdYP/xAAcAQABBQEBAQAAAAAAAAAAAAAAAQIEBQYDBwj/xAAzEQACAgEDAgMFBwQDAAAAAAAAAQIDEQQSIQUxQVFhEyIycdEGFFKBkbHhI0KhwRUzNP/aAAwDAQACEQMRAD8AyCUuqFFkTelbpdURAC6XREALpdEQAuq3VEQBn4LLaUD7QI+8fJSG6iUMmVzXdCD6FSwFSanwZXrtW26M/NfsVul1RF0KMrdLqiIArdLqiIArdLqiIArdLqiIArdLqiIArdLqiIArdLqiIAvXRESAQoohRQz0YIiIAIiIAIsfEqgxwzSN7zI3Ob52sD7r39yg1DtXUtN3uEjTyc0fAtAIUqnSyti5Ih362FM1GXidBRYWEYnHUNuzRw7zD3h4+I8VmrhOEoPEkSa7I2LMWFJsNkzRMPhY+7T7lGVusAk0e3oQfUW+74p1T5wVXW6t2n3fhf8ABtURFIMiEREAERR3a3aplGA0APmcLtZfQD7b7cB4cSnRi5PCHRi5PCJEUBXDMRxCoqTmlme7wBs23QNGi3fZ5jkkFQ2me4mKW+UE9x/G4PQ2OnkpD03Hfk7vTtLudYREUUjBERABERABUJsqSSBouVr5py7y6J0Y5O9NDsfobH6Wzr8CqLXon7ETPucPU0RRCirTZhERABERAGLirCYJwOJik/wlQA0nsAgcl0prb6Hgbj1FvvUEidZpaeIuD7lZ6KWINepSdUj76foaWlrJIJA+Nxa4HT7wfBdGwXGY6pmZtmyDvx31/faObfkue1TAdbLGoax8MjZGOs5puD8CCOYtcKZbTG6GH3K/TamVE8+B1lZ2DSWlA+0CPvHyWjwXFmVLMzbNe3vsvw/ab1b8lsIn5XNd0IPobqlcJVzxI0Fu3U6eSj4pktRAUUgwgRF4nlaxpc4gNaLkngAlFXJg4/i7KWF8r7aD2W3sXu5NC4nVVL55XyyG73nMeQ8APC2i3O2W0BqpdD+ijJDB16uPifktXQQE/V0VhVX7OOX3JtcNq9TY0lPzVxlP+sUxA13rR6mx+az6WLKL25LX70mppwL338XD/qtTYPMiR4HZAiIoBUhERABWp5w3z6LxUVNtBx+SwSb8U+Mc9yXRpnLmXYrJIXG5XlEXUsUklhF1ERIONEUQoqs1AREQAREQAUSxmiyTydHe2PJ2p+N1LVqNqG2iZKOMbsp8WP5e4gfFTNHPbPHmV3Uq91W7yIrWRAD3LQVB1KkVbMHNuOBUbrCLlXNRmrGeqOvfGQ5jy1zTcEGx8f8ARS3DNuHHSaLMftMIaT5t4ellBmNurkbrJ1lMLPiQtOptqfuM7VR7eUYjYHPfmAAtunE9OI0+Ku/y+orE5pPLdm/4LjTJNF73lwuH3SBxkoybbXc6hiHaZA1pMcUjncg7KG+oJKg+L7XT1ZdvHZWX9mNps0eZ4n3rQSMJVixC6wohHsCaXwo2bfmpDgsJNlFaZ97X5KQU0zo2h4cDfXLfp4FJYvA6QZI3M5LB2fos2IU4vezzIfJjSR8bKk2IWFxxtf8ABbTs4gz1Ms51yx5R4F7xYD3MPqoq91NnSyWIs6MiKj3AC5UIrUslVh1FVyb6/grdRUF2g0HzVhdYw8yfRpse9MIiJ5NCIiALqIiQU0V0XtwXgs6KTf0Sa5qln5kLRfbOieI6mDi/Ncr6r/IRU9yqCqi2iyp4nFo1mm1lGpjupmpL0YREXEkharam/wBFkIF7FjvcHi59FtVi4q1pgnDzZu6fcnoWkLrQ8WR+Zw1KTpkn5M5/V1Ps8Br06rSuFzdVY42sV7AWkisGLbyN0vZpxbxVqV5Xuml5Jwh63aq1lrq7ZYtS9IB6adUfFdWGFZI87+9D4A8BuiuUkhzAHUHqfvVHusrRk425oxlCm7qXkA3IA69fLwXQuyqiy0jpT/xpCW/uMu0fHMfeuQSzuc0Bdn7P8TDsPgAHtRgxHpdp4+ViFE1EWq+AlumtqJTLKGjVa+aUuOvovL3km5XlQ4xwSqaFXy+4RETiQEREAEREAXUREgppSiFFrTysLyWhekSSipLDWR9ds6pboNp+nB4ylUv7lcRVl/SKLOY+6/Tt+hp9F9rdbRxbia9eH+q/2meFrtowPotRm/5Zt+9cZP71lssnuWBjjGmnnz93duN+hAu0+dwFVS6XdTNS7pPw+hqqPtNotZW4Z2yaxiXn6Pt+xyx5W8iwRjYTPM5wjD2xgNHtOcQHOsD0BWicphg9RDVUT6OWVsUjZN9BI8gMJLQ10bnHQcOfXwUvUSlCKa7ZWfkVsMZNFHhJkY97NWtLsvtNzEN6szFw0IN+HK5Wpj0cpxh2F/QWTSTSxulcwsjjZI117nV2nLQa9FCp++fzcpard8pY7BJYRlFwsVYijLivLHaEFZGHyAH8+5dnwhESCowyOko4JTG2WaqBLXO1bE0EOBa3gXWFtftHotzs3h1LWGSB5bJII96yWON0ZaRlBabgXsX24WIB4hYWHYhTTUrKStc6PdEmGZrb5QfquaNfgeCu0eK0WHxStpXvqZ5RlMjmljGjW1gQCQL305qpsnbKEoYe/PDXbGeHnthLwOqwnnPBE8ZjaHNygA5RmH7QJB+S14Zqrkj7leX3urWKwsHFvJ70XWdhR+ow6W7/AK53XK5DmXZdkLfQqe32Pjc3C46n4Tvp/iNuiIoJMCIiACIiACIiALqIiQU0pRCi1p5WEREAEREAFqNrP90l/sj1cPwW3Wt2ngL6OoA4hrX/AMLgT8Lrlf8A9bJnT8feYZ8zlbyqRO10KtFyoFXG0NiyVY0bL3815EiuRTgaFGAKSN0VlqyzUNIsBc/FWo2oAuSOJAK8Bt+KqXDqrWY8kgFbr2w6Kzqq5kohVq6r2dy3pLfZkcPUA/nzXJXOXYNhMPMNI3NxkO943sCAGjzsFw1Pwnehe8SFERQCaEREAEREAEREAXUREgppSiFFrTysIiIAIiIAILagi4III6gixHoURI1lYYsZOLTXgck2hwswzvZY2DvZ8W8Wm/ktc0a8fRdY2gwdtSy2X2xezudrE2P55rmtbQuhNi0jxsqqS2ScGbfS3q+pWLx/cw3pfMvL3rw2RKSD2CRceqqx+i8kjqredAF9r1dB5/6LHjcshsgSAUPhqrTj1Cubsk2AJ8lKdmNi56lwztLWdT934pspxissVLJosBwp08zGNBILhfTgOZ9F26KINa1rdGtAaPICwUXxqlGEvpC1oLHiVsnVwBhsfBwzHhxUmpqhkjQ+Nwc12oI/OhUK2e/DXYl0pIuIiLgdwiIgAiIgAiIgC6iIkFNKUQotaeVhERABERABEQBAGxwaJj3mMn2zG6RrerQ5oJ9SFgY3gbZLktuD1ChWK7RyU2JCaM33JDMt9HRgWfGT46++x5LuFJuquGOeH2mSNDgba+II5EG4I6hUerjv/qI3Gjr9hVGHocExPYx1zuz7io7PgE7blzbAc19IS7Llx6Li3aBjce/fTROuInAFw4OkafaHkDoolV17nsJrUcZIacPk6Kn0KQclIqQOka3JqTy6HopbgeyDzZ8h0uPZ5Lv95aeHjI1xWMnP8N2cqJjZjCSBe3O3X5eoUqwns0qHkZwRddZpMOZTMEzALs9qx4lv12e8X99lN4Mr2te2xa4BwI5gi4PoVEr1V1+dnGHge4xjh9zmeznZnHFZzhmcNdfkpxSYe1g0Fh5ahbjKsers1rnPeGMAJcTYAADUknQJdk/7uRu44124VI/VYh3ryyHwADGAeRJd/AodshjroHGPNZsnC49kP5E+fBZHaLtEytq3PjH6NjREy/FzWlxLz+8XE+VlFWO196mV1/09rFjZtmpI61TbQt4SNLTwuNR6cfmttBUMeLscHDwPzHJQWR17HmWgm3C5GtvBGPINwSD1BsfVQmsPBsZdKqugp1vblZ80T5FFaXH5W96zx46O9R94W4pcbifxOQ9HcP4uCQq7+m6irlrK9OTZIgPNEEAIiIAuoiJBTSlEKLWnlYREQAREQAXqLvN8x815Wpr8aDHBrNSCLniBrqB1KMN8IlaPS2aixRgv4Oe48688p/bd8yuodgW0Bzz0TjoRv4h4ggStHS92n3FcsxlmWeUdHu5359UwDHZaKojqISM7L2uLtIcLOa4cwQVVQxtwzbSPo3tP2pFBQvcDaeUGOFvE5iNXnwaLnzsOa+VHuJNyTcm9+ZPW6kW2O1E+ITb6ci4GVrW3DGN42aCTxPE89FH3NCbXBRA6TsA1ofC51iyoBZf7FQyxcw9M7HMeOtz0K7FRQC1raLjOxmAyyRU7S4sbO8PBy3dGYi50b26jUh7xfo6y6PiW0T2yilgb9IkDbyPj9gR8OJJIueeqqepQUp5h3H1Zxhml7RdrDSRyRMIL5Blbr3NNXW963PYJtNv6N1K915KXRt+Jhd3f4TdvllXIO0yhljq7yvztkYHxm1gBwcy3UOBHjoea1Oye0ctBUx1EJ9pmhaeD2HvMPgR6EA8lZaOEfZ7uMyw8+oyWVx5H2K54AJJAAFyToABxJXz32qdohrHGCndamadSP+MR9Y/sDkOfHpbYdpHazDVUe4o9410tt6XNy2Za5jBvrc2Btpa/VccMt10ab7gZe8XuB2vVYYesunSsCa0VUJI2EC2UZSOlleWiwSrDbtPA29x4A+S3qrro7ZG86NqVdpks8x4f+giIuRbF+mq3x9xxb4cveOC3FJtGeEjL+Lf/AFP4rQIgjX6Om744/Um9LXxydx4J6cD6FZK5+s+kxiVn1sw6O1+PFBT39Fa5ql+T+pNkUb/lM7/lN/iP4Igh/wDE6r8P+UZRRCi1h40EREAFRzgASTYDiSrdRUNY0ucbD86AdVF8SxJ0ptwZyHXxd4p0YuXYsun9Ms1cs9o+L+hlYrjBddsZs3m7m7y6Bahg1HmqK5FYAvd3Wanx6N96kPbXFs22n01Wmr2VrCI3jL71Ex/bI9DZa2ZqvyyFznOPFziT5k3VmUrPkdmO5bLZLBHVlXDA3g93tHpGNXu9AfeQta5q6J2aSsooZKstDppS6KFpNgI2AGWZx5Rg2uf2LDUhJOTUW49xCZbYBtKxscbzGLWuBd4j7o3Q4GQgCMX568iVtdlNn3wuZPI3d5mFscA1ELHlrnF7zq+Vxa0ue7XTpotVsvhslZIK2pJIB/QNc2wJ1/TFn1RrZreQ4kkknoc8wEd3cupGvv8AvWb1uo2VumD5/ufn6EmqHO5nPu2jAhNS72MAyU53h0FzGRZ7b+jtb90DmuAL6ixKotE4E+1ICLeB0cfmLcv7K+bdoMP3FRLFya45fFh1afQhT+jWS9m4Psuw29LOTX5kBVF6aVcnAvxrMiOmiwmFZkBumsUuRSlpBCmGHTZowfz5KHALfbMzDM6O/eF2+YXC6O6JZ9J1XsNTF+D4f5m8REVeb8IiIAIiIA9IiIHkpKIUWsPmoLEr69sQudSeDRxP4DxWPimLCO7W+0/4N8/HwUalkLiXONyeJK6Qr3cvsX3TejSuxZdxHy8X/BcrKt0jruPkOQ8lYRFJSS4RsIQjCKjFYSC1+0U5AZHfgMxH7Rvx91luKJvtZj3We0fIfkKI4hPme4kk3JNyq3X29q18zldLjBYurLnK5mWPMSq8jFHOXW9gtkxNHGZGkU4yuOYWdUPBzBtvqwNdcgfWNyfDlOFxbyaJhGj5GNt+88A/NfW8kDQxosGta0AaaBoHDyVd1PVSoqxHxH1QTfJgPcGDoB+QAB8lrpcR+s/Ro0AuLjjYDjqbfDoPa1+K4iQTn0Y2/HXwv4nlbjy+1ljs2IuleLXt9UDx4nTS5sNfwCpNLop3ywvEk3XRhHLNxK8vc5x56AcgOQHgoB2sYHZkNU0aF24d1Jyl7T5aOF10vZ/DS8+0crGi73dB081i9qeFCfDZyxuXdBs0bNBaNhGeR3i5pdYLRpQ0+2qPPmVsJStlvfY+ckXp6oFLOpdYs2JvNYkazIhomsUoXarJo5S1wcDq0ghYsoV2FIwRPHODrOHBwDvXiPVeViYHPngseMTg3+y65HyKy1WWR2yaPRenaj2+mjPx7P5oIiJhNCIiAPSIiB5KStFimNcWxHzd9zfxWLiuLGS7W3az4u8/DwWrWzhV4s8W6Z0VQxZeufBeXzCIi7mkC2WzGC/TayCmzFjH5nyObo7dsFyGnkSS0X5XJWtUs7KP51i/q8/ziXDUycam0c7XiLJudi8HdO+hFKRKIGzFwfKHZHPLAd7nzF128DooNsf2eUxxbEKKqaaiOnjY+Il8jDZ5a5pJjc25yuseVwV0Wm/pBP8A/Wxf9y9YGA/0jxP+q0/yYqUhGqwbs2wySuxGF1KTHD9G3bd/UDLvI3OfqJLm5A43Wm2H2Cw+oxDGIZqfPHSzRshbvZhka7e3F2vBPcbxJ4Lo2zv854t5Uf8AkvUf7M/512h/rEXznQBDdtsFweGanp8OtFXiugidrUPLA4kZrSksNnFh/JXRarZ3DoZKWnmZLNLVOe1skksr3l0cZkc5z8/saN0y215Bc67YW4fDO2oo3h2JNrY3yNzSOIytc4fozp3mx8F0DCsZosbgbFURPimAzbt+eOVjwLGSCTQka8RyNnCxsUaT7gRbHcMoaTETBXTTuofou/ia6SpcWSmTI5ueE53ANZcZybZiApRiex2D0sW/lZLHGC0ZhU1xN3uDWgNZIXalwHDmoLjuyrqM10DiZrUMs0Uzr5jC1jw5kl9M7TbUaHONLrpO3LL0EIy571FF7N7Zv1mLS/JGIwXujU3JtNEf7PtnqWqgqnuNS5grahkX63Ws/QNcNyCzeA90jvC/VWtgsK/+Rhe+rklfBE91OyEyvAkMfflncDmk45Q1xIAbwJJUq2AHsVurT+uy90Wb3I+6Oi1fY7/N8v8AWqn/ADCmpKSUsDiObR7BYZXYZJWUMBge2OV8ZbdufcueHMdGTl1LHAHxB8Fh7DdmlDWYMyUwfrUscobJvZRaQOe2N2TPk0s3Sylmwv8AR/8A/Gs/zZ1e7HZmswWkLjYe2LnxncB8SE8Dnz9hqFuzv0005FUIcxeZJrh+9ym8efLw0tZSLCdhsLocPhqK2n38kjYd452Z9nzFoDWMuGhoL+Nr2HM6KR9ptI2LBa5jNG5XOt0L5w8jyu4rSdn+2FPW0cVFXRFj92yL9KxwhnAADHNkIsHmzTbQ37vgARTte7PqelNI+jaYhUTinMZc5zA9+rHNzEkcDccOFrKZfyCwmiFJBLS/SH1Mm43jyS7Pu3PLjqA0ewRZo5+9QPtU2EfRSQSwzyugmmaxofI9z4JSbtLXX1FgbHiLWub3Uzwjs0rYayjnkxJ9WyGUvcyXeiw3bmhzA6R4Ju4DloeKAI/tZstHh9Q6KHNuZ49+xrnFxY6J4ZIzMdS20zCL3PFaBT3tanBrqKNrmlzaepc5t9cr3QhuniWOt+6VAlX6pYmbX7PWbtM4+T/cIiKMXwREQB6REQPNaUQot0edBERABbjY3GmUddBPLpEA+KRwBORsjRZ9hyDmtv4EladEyyG+LiNlHcsHe6WKB1TLikVQ2aM0ggIiG87kjpS4FhJcbOAygX9VzfZ/bmFu0FZLUB1NFURsiYZmmMtyNZkc8O7rXZXEE8Li6hs+0tZh7jHSVD4Wvs+RobG5pkygFwD2mxsGg26BRXGMYmqpnTVEhkkcAHOIaLhosNGgDgFQvCbSILWHg+popKalmrK2SriEdQISbuaGtETC3R1/avm5D1UC7Ito4JK3Gp3yMibPNE+PePawluaexs4jWxF/NcKyjoPRW3pMiHa+0jA8OhkdisVWZZxVQSmJs0LmECRmbKxozcG9V0Kd9LiD6CrhrI8lNI6WwLSXZ4iwsddwLCL63HUL5PLV4clA7T2wbb07qndQS7xoo6iCR0RaW55bZWF3MAxi9vtW6hTXtD2jpmYa1zZopDHLSyFjJWF5DJ43EAA9AV8vqt0jSawB9MdkW08UlHNLPNDE+WqleWGRrbAhgFg43tYcVrexfaymDKmjklZHIKmV7A5wAkY839gnQkEHTpYr54RCSSwgPpzGMSpcIwd9M6pjkk3U7YmggPe+Vz3D9GHE5QZBc9AtDgOLxM2Xc0TxtmEExa3eNEgdvXFtm3vfgVwIKrRqlA+mNutpqeqwKd7Zos81PG/d7xmcOcWEtyXvcG4t4LzhNVTYvg0FMyrZFK2OmbINM7HwOjLv0ZcDYmM2PjfVfNoCyImg8gkyB3jtu2kpnRU1JHO10v0mJ78jmuMTG39px1AN3NsD4la/tYr3wQ0z4MXmneJyLCSlBaDE+7r08bHdBqSNeC41I0DSysN4oyBuo8ReZt86R75CQ4ve4ucfMnX3KZ1BByvGge0Ot0J4/Fc+Yp3AQYKcg6ZMvvadfmompXu5L/7P2NanbnhphFk/QJPs/wB5v4p9Bk+z/eb+Piom1+Rr/b1/iX6oxkWR9Bk19nhb6zefDnzsgo3n6vDTvN6A9ehHqja/IX21f4l+pZResniPUKqNr8h3t6vxL9TWIiLcmACIiBArlN32/vD5oiR9gZpdrf8AalRt3FEWaj2ID7l5WFRE4QK2fu/BVRKIW0REoBERAFQvQREAXFfgRE0U91SxgiIQGwp+CnGD/wC5s/6rv8IRFH1Hwlt0P/2R/P8AYxpeLv3vvKyZv9jF5yf+CIuK7Ght+JfMxWcvNv8AhKcm+R+RRE0ei4iInCH/2Q=="/>
+          <p:cNvSpPr>
+            <a:spLocks noChangeAspect="1" noChangeArrowheads="1"/>
+          </p:cNvSpPr>
+          <p:nvPr/>
+        </p:nvSpPr>
+        <p:spPr bwMode="auto">
+          <a:xfrm>
+            <a:off x="155575" y="-1828800"/>
+            <a:ext cx="3810000" cy="3810000"/>
+          </a:xfrm>
+          <a:prstGeom prst="rect">
+            <a:avLst/>
+          </a:prstGeom>
+          <a:noFill/>
+          <a:extLst>
+            <a:ext uri="{909E8E84-426E-40DD-AFC4-6F175D3DCCD1}">
+              <a14:hiddenFill xmlns:a14="http://schemas.microsoft.com/office/drawing/2010/main">
+                <a:solidFill>
+                  <a:srgbClr val="FFFFFF"/>
+                </a:solidFill>
+              </a14:hiddenFill>
+            </a:ext>
+          </a:extLst>
+        </p:spPr>
+        <p:txBody>
+          <a:bodyPr vert="horz" wrap="square" lIns="91440" tIns="45720" rIns="91440" bIns="45720" numCol="1" anchor="t" anchorCtr="0" compatLnSpc="1">
+            <a:prstTxWarp prst="textNoShape">
+              <a:avLst/>
+            </a:prstTxWarp>
+          </a:bodyPr>
+          <a:lstStyle/>
+          <a:p>
+            <a:endParaRPr lang="nl-NL"/>
+          </a:p>
+        </p:txBody>
+      </p:sp>
     </p:spTree>
     <p:extLst>
       <p:ext uri="{BB962C8B-B14F-4D97-AF65-F5344CB8AC3E}">
@@ -15747,6 +15962,13 @@
   <p:clrMapOvr>
     <a:masterClrMapping/>
   </p:clrMapOvr>
+  <p:timing>
+    <p:tnLst>
+      <p:par>
+        <p:cTn id="1" dur="indefinite" restart="never" nodeType="tmRoot"/>
+      </p:par>
+    </p:tnLst>
+  </p:timing>
 </p:sld>
 </file>
 
@@ -16622,8 +16844,9 @@
             </a:pPr>
             <a:r>
               <a:rPr lang="en-US" dirty="0" smtClean="0"/>
-              <a:t>Problem!!</a:t>
-            </a:r>
+              <a:t>Problem according to the paper!!</a:t>
+            </a:r>
+            <a:endParaRPr lang="en-US" dirty="0" smtClean="0"/>
           </a:p>
           <a:p>
             <a:pPr marL="0" indent="0">
@@ -16631,15 +16854,11 @@
             </a:pPr>
             <a:r>
               <a:rPr lang="en-US" dirty="0" smtClean="0"/>
-              <a:t>The </a:t>
-            </a:r>
-            <a:r>
-              <a:rPr lang="en-US" dirty="0" err="1" smtClean="0"/>
-              <a:t>PostreSQL</a:t>
+              <a:t>SQL </a:t>
             </a:r>
             <a:r>
               <a:rPr lang="en-US" dirty="0" smtClean="0"/>
-              <a:t> Planner found these queries exceedingly difficult to compile.</a:t>
+              <a:t>Planner found these queries exceedingly difficult to compile.</a:t>
             </a:r>
           </a:p>
           <a:p>

</xml_diff>